<commit_message>
New September Blog Section
</commit_message>
<xml_diff>
--- a/assets/SoCS SU Organisation Chart - Editable.pptx
+++ b/assets/SoCS SU Organisation Chart - Editable.pptx
@@ -243,7 +243,7 @@
           <a:p>
             <a:fld id="{8EA370C3-DB3A-B74B-BC6D-81BA3E128968}" type="datetimeFigureOut">
               <a:rPr lang="en-US" smtClean="0"/>
-              <a:t>7/22/20</a:t>
+              <a:t>9/12/20</a:t>
             </a:fld>
             <a:endParaRPr lang="en-US"/>
           </a:p>
@@ -413,7 +413,7 @@
           <a:p>
             <a:fld id="{8EA370C3-DB3A-B74B-BC6D-81BA3E128968}" type="datetimeFigureOut">
               <a:rPr lang="en-US" smtClean="0"/>
-              <a:t>7/22/20</a:t>
+              <a:t>9/12/20</a:t>
             </a:fld>
             <a:endParaRPr lang="en-US"/>
           </a:p>
@@ -593,7 +593,7 @@
           <a:p>
             <a:fld id="{8EA370C3-DB3A-B74B-BC6D-81BA3E128968}" type="datetimeFigureOut">
               <a:rPr lang="en-US" smtClean="0"/>
-              <a:t>7/22/20</a:t>
+              <a:t>9/12/20</a:t>
             </a:fld>
             <a:endParaRPr lang="en-US"/>
           </a:p>
@@ -763,7 +763,7 @@
           <a:p>
             <a:fld id="{8EA370C3-DB3A-B74B-BC6D-81BA3E128968}" type="datetimeFigureOut">
               <a:rPr lang="en-US" smtClean="0"/>
-              <a:t>7/22/20</a:t>
+              <a:t>9/12/20</a:t>
             </a:fld>
             <a:endParaRPr lang="en-US"/>
           </a:p>
@@ -1007,7 +1007,7 @@
           <a:p>
             <a:fld id="{8EA370C3-DB3A-B74B-BC6D-81BA3E128968}" type="datetimeFigureOut">
               <a:rPr lang="en-US" smtClean="0"/>
-              <a:t>7/22/20</a:t>
+              <a:t>9/12/20</a:t>
             </a:fld>
             <a:endParaRPr lang="en-US"/>
           </a:p>
@@ -1239,7 +1239,7 @@
           <a:p>
             <a:fld id="{8EA370C3-DB3A-B74B-BC6D-81BA3E128968}" type="datetimeFigureOut">
               <a:rPr lang="en-US" smtClean="0"/>
-              <a:t>7/22/20</a:t>
+              <a:t>9/12/20</a:t>
             </a:fld>
             <a:endParaRPr lang="en-US"/>
           </a:p>
@@ -1606,7 +1606,7 @@
           <a:p>
             <a:fld id="{8EA370C3-DB3A-B74B-BC6D-81BA3E128968}" type="datetimeFigureOut">
               <a:rPr lang="en-US" smtClean="0"/>
-              <a:t>7/22/20</a:t>
+              <a:t>9/12/20</a:t>
             </a:fld>
             <a:endParaRPr lang="en-US"/>
           </a:p>
@@ -1724,7 +1724,7 @@
           <a:p>
             <a:fld id="{8EA370C3-DB3A-B74B-BC6D-81BA3E128968}" type="datetimeFigureOut">
               <a:rPr lang="en-US" smtClean="0"/>
-              <a:t>7/22/20</a:t>
+              <a:t>9/12/20</a:t>
             </a:fld>
             <a:endParaRPr lang="en-US"/>
           </a:p>
@@ -1819,7 +1819,7 @@
           <a:p>
             <a:fld id="{8EA370C3-DB3A-B74B-BC6D-81BA3E128968}" type="datetimeFigureOut">
               <a:rPr lang="en-US" smtClean="0"/>
-              <a:t>7/22/20</a:t>
+              <a:t>9/12/20</a:t>
             </a:fld>
             <a:endParaRPr lang="en-US"/>
           </a:p>
@@ -2096,7 +2096,7 @@
           <a:p>
             <a:fld id="{8EA370C3-DB3A-B74B-BC6D-81BA3E128968}" type="datetimeFigureOut">
               <a:rPr lang="en-US" smtClean="0"/>
-              <a:t>7/22/20</a:t>
+              <a:t>9/12/20</a:t>
             </a:fld>
             <a:endParaRPr lang="en-US"/>
           </a:p>
@@ -2353,7 +2353,7 @@
           <a:p>
             <a:fld id="{8EA370C3-DB3A-B74B-BC6D-81BA3E128968}" type="datetimeFigureOut">
               <a:rPr lang="en-US" smtClean="0"/>
-              <a:t>7/22/20</a:t>
+              <a:t>9/12/20</a:t>
             </a:fld>
             <a:endParaRPr lang="en-US"/>
           </a:p>
@@ -2566,7 +2566,7 @@
           <a:p>
             <a:fld id="{8EA370C3-DB3A-B74B-BC6D-81BA3E128968}" type="datetimeFigureOut">
               <a:rPr lang="en-US" smtClean="0"/>
-              <a:t>7/22/20</a:t>
+              <a:t>9/12/20</a:t>
             </a:fld>
             <a:endParaRPr lang="en-US"/>
           </a:p>
@@ -6000,8 +6000,8 @@
         </p:nvSpPr>
         <p:spPr>
           <a:xfrm>
-            <a:off x="3223770" y="1956040"/>
-            <a:ext cx="895337" cy="338554"/>
+            <a:off x="3244087" y="1909354"/>
+            <a:ext cx="895337" cy="461665"/>
           </a:xfrm>
           <a:prstGeom prst="rect">
             <a:avLst/>
@@ -6017,7 +6017,15 @@
             <a:pPr algn="ctr"/>
             <a:r>
               <a:rPr lang="en-US" sz="800" dirty="0"/>
-              <a:t>Monthly Meetings (tbc)</a:t>
+              <a:t>Monthly Meetings (12</a:t>
+            </a:r>
+            <a:r>
+              <a:rPr lang="en-US" sz="800" baseline="30000" dirty="0"/>
+              <a:t>th</a:t>
+            </a:r>
+            <a:r>
+              <a:rPr lang="en-US" sz="800" dirty="0"/>
+              <a:t> of each Month)</a:t>
             </a:r>
           </a:p>
         </p:txBody>
@@ -6239,7 +6247,7 @@
         <p:spPr>
           <a:xfrm>
             <a:off x="6127599" y="585928"/>
-            <a:ext cx="670420" cy="338554"/>
+            <a:ext cx="670420" cy="461665"/>
           </a:xfrm>
           <a:prstGeom prst="rect">
             <a:avLst/>
@@ -6255,7 +6263,7 @@
             <a:pPr algn="ctr"/>
             <a:r>
               <a:rPr lang="en-US" sz="800" dirty="0"/>
-              <a:t>Meetings (tbc)</a:t>
+              <a:t>Monthly Meetings (tbc)</a:t>
             </a:r>
           </a:p>
         </p:txBody>

</xml_diff>

<commit_message>
Update organisation chart - Include SVG version
</commit_message>
<xml_diff>
--- a/assets/SoCS SU Organisation Chart - Editable.pptx
+++ b/assets/SoCS SU Organisation Chart - Editable.pptx
@@ -243,7 +243,7 @@
           <a:p>
             <a:fld id="{8EA370C3-DB3A-B74B-BC6D-81BA3E128968}" type="datetimeFigureOut">
               <a:rPr lang="en-US" smtClean="0"/>
-              <a:t>2/7/21</a:t>
+              <a:t>6/27/2021</a:t>
             </a:fld>
             <a:endParaRPr lang="en-US"/>
           </a:p>
@@ -413,7 +413,7 @@
           <a:p>
             <a:fld id="{8EA370C3-DB3A-B74B-BC6D-81BA3E128968}" type="datetimeFigureOut">
               <a:rPr lang="en-US" smtClean="0"/>
-              <a:t>2/7/21</a:t>
+              <a:t>6/27/2021</a:t>
             </a:fld>
             <a:endParaRPr lang="en-US"/>
           </a:p>
@@ -593,7 +593,7 @@
           <a:p>
             <a:fld id="{8EA370C3-DB3A-B74B-BC6D-81BA3E128968}" type="datetimeFigureOut">
               <a:rPr lang="en-US" smtClean="0"/>
-              <a:t>2/7/21</a:t>
+              <a:t>6/27/2021</a:t>
             </a:fld>
             <a:endParaRPr lang="en-US"/>
           </a:p>
@@ -763,7 +763,7 @@
           <a:p>
             <a:fld id="{8EA370C3-DB3A-B74B-BC6D-81BA3E128968}" type="datetimeFigureOut">
               <a:rPr lang="en-US" smtClean="0"/>
-              <a:t>2/7/21</a:t>
+              <a:t>6/27/2021</a:t>
             </a:fld>
             <a:endParaRPr lang="en-US"/>
           </a:p>
@@ -1007,7 +1007,7 @@
           <a:p>
             <a:fld id="{8EA370C3-DB3A-B74B-BC6D-81BA3E128968}" type="datetimeFigureOut">
               <a:rPr lang="en-US" smtClean="0"/>
-              <a:t>2/7/21</a:t>
+              <a:t>6/27/2021</a:t>
             </a:fld>
             <a:endParaRPr lang="en-US"/>
           </a:p>
@@ -1239,7 +1239,7 @@
           <a:p>
             <a:fld id="{8EA370C3-DB3A-B74B-BC6D-81BA3E128968}" type="datetimeFigureOut">
               <a:rPr lang="en-US" smtClean="0"/>
-              <a:t>2/7/21</a:t>
+              <a:t>6/27/2021</a:t>
             </a:fld>
             <a:endParaRPr lang="en-US"/>
           </a:p>
@@ -1606,7 +1606,7 @@
           <a:p>
             <a:fld id="{8EA370C3-DB3A-B74B-BC6D-81BA3E128968}" type="datetimeFigureOut">
               <a:rPr lang="en-US" smtClean="0"/>
-              <a:t>2/7/21</a:t>
+              <a:t>6/27/2021</a:t>
             </a:fld>
             <a:endParaRPr lang="en-US"/>
           </a:p>
@@ -1724,7 +1724,7 @@
           <a:p>
             <a:fld id="{8EA370C3-DB3A-B74B-BC6D-81BA3E128968}" type="datetimeFigureOut">
               <a:rPr lang="en-US" smtClean="0"/>
-              <a:t>2/7/21</a:t>
+              <a:t>6/27/2021</a:t>
             </a:fld>
             <a:endParaRPr lang="en-US"/>
           </a:p>
@@ -1819,7 +1819,7 @@
           <a:p>
             <a:fld id="{8EA370C3-DB3A-B74B-BC6D-81BA3E128968}" type="datetimeFigureOut">
               <a:rPr lang="en-US" smtClean="0"/>
-              <a:t>2/7/21</a:t>
+              <a:t>6/27/2021</a:t>
             </a:fld>
             <a:endParaRPr lang="en-US"/>
           </a:p>
@@ -2096,7 +2096,7 @@
           <a:p>
             <a:fld id="{8EA370C3-DB3A-B74B-BC6D-81BA3E128968}" type="datetimeFigureOut">
               <a:rPr lang="en-US" smtClean="0"/>
-              <a:t>2/7/21</a:t>
+              <a:t>6/27/2021</a:t>
             </a:fld>
             <a:endParaRPr lang="en-US"/>
           </a:p>
@@ -2353,7 +2353,7 @@
           <a:p>
             <a:fld id="{8EA370C3-DB3A-B74B-BC6D-81BA3E128968}" type="datetimeFigureOut">
               <a:rPr lang="en-US" smtClean="0"/>
-              <a:t>2/7/21</a:t>
+              <a:t>6/27/2021</a:t>
             </a:fld>
             <a:endParaRPr lang="en-US"/>
           </a:p>
@@ -2566,7 +2566,7 @@
           <a:p>
             <a:fld id="{8EA370C3-DB3A-B74B-BC6D-81BA3E128968}" type="datetimeFigureOut">
               <a:rPr lang="en-US" smtClean="0"/>
-              <a:t>2/7/21</a:t>
+              <a:t>6/27/2021</a:t>
             </a:fld>
             <a:endParaRPr lang="en-US"/>
           </a:p>
@@ -2957,6 +2957,14 @@
 <file path=ppt/slides/slide1.xml><?xml version="1.0" encoding="utf-8"?>
 <p:sld xmlns:a="http://schemas.openxmlformats.org/drawingml/2006/main" xmlns:r="http://schemas.openxmlformats.org/officeDocument/2006/relationships" xmlns:p="http://schemas.openxmlformats.org/presentationml/2006/main">
   <p:cSld>
+    <p:bg>
+      <p:bgPr>
+        <a:solidFill>
+          <a:srgbClr val="F5F5F5"/>
+        </a:solidFill>
+        <a:effectLst/>
+      </p:bgPr>
+    </p:bg>
     <p:spTree>
       <p:nvGrpSpPr>
         <p:cNvPr id="1" name=""/>
@@ -2971,61 +2979,6 @@
           <a:chExt cx="0" cy="0"/>
         </a:xfrm>
       </p:grpSpPr>
-      <p:sp>
-        <p:nvSpPr>
-          <p:cNvPr id="2" name="Rectangle 1">
-            <a:extLst>
-              <a:ext uri="{FF2B5EF4-FFF2-40B4-BE49-F238E27FC236}">
-                <a16:creationId xmlns:a16="http://schemas.microsoft.com/office/drawing/2014/main" id="{E6897DE7-35A7-DC46-BB94-1AD43A4BAE85}"/>
-              </a:ext>
-            </a:extLst>
-          </p:cNvPr>
-          <p:cNvSpPr/>
-          <p:nvPr/>
-        </p:nvSpPr>
-        <p:spPr>
-          <a:xfrm>
-            <a:off x="0" y="0"/>
-            <a:ext cx="9144000" cy="6858000"/>
-          </a:xfrm>
-          <a:prstGeom prst="rect">
-            <a:avLst/>
-          </a:prstGeom>
-          <a:solidFill>
-            <a:schemeClr val="bg1">
-              <a:lumMod val="85000"/>
-              <a:alpha val="22000"/>
-            </a:schemeClr>
-          </a:solidFill>
-          <a:ln>
-            <a:noFill/>
-          </a:ln>
-        </p:spPr>
-        <p:style>
-          <a:lnRef idx="2">
-            <a:schemeClr val="accent1">
-              <a:shade val="50000"/>
-            </a:schemeClr>
-          </a:lnRef>
-          <a:fillRef idx="1">
-            <a:schemeClr val="accent1"/>
-          </a:fillRef>
-          <a:effectRef idx="0">
-            <a:schemeClr val="accent1"/>
-          </a:effectRef>
-          <a:fontRef idx="minor">
-            <a:schemeClr val="lt1"/>
-          </a:fontRef>
-        </p:style>
-        <p:txBody>
-          <a:bodyPr rtlCol="0" anchor="ctr"/>
-          <a:lstStyle/>
-          <a:p>
-            <a:pPr algn="ctr"/>
-            <a:endParaRPr lang="en-US"/>
-          </a:p>
-        </p:txBody>
-      </p:sp>
       <p:sp>
         <p:nvSpPr>
           <p:cNvPr id="5" name="Rounded Rectangle 4">
@@ -3086,7 +3039,7 @@
                   <a:schemeClr val="tx1"/>
                 </a:solidFill>
               </a:rPr>
-              <a:t>Georgia Petts</a:t>
+              <a:t>Talia Adams</a:t>
             </a:r>
           </a:p>
           <a:p>
@@ -3162,26 +3115,18 @@
                   <a:schemeClr val="tx1"/>
                 </a:solidFill>
               </a:rPr>
-              <a:t>Jack Eames</a:t>
+              <a:t>Owen Liggins</a:t>
             </a:r>
           </a:p>
           <a:p>
             <a:pPr algn="ctr"/>
-            <a:r>
-              <a:rPr lang="en-US" sz="800" dirty="0" err="1">
-                <a:solidFill>
-                  <a:schemeClr val="tx1"/>
-                </a:solidFill>
-              </a:rPr>
-              <a:t>CoS</a:t>
-            </a:r>
             <a:r>
               <a:rPr lang="en-US" sz="800" dirty="0">
                 <a:solidFill>
                   <a:schemeClr val="tx1"/>
                 </a:solidFill>
               </a:rPr>
-              <a:t> Officer</a:t>
+              <a:t>CoS Officer</a:t>
             </a:r>
           </a:p>
         </p:txBody>
@@ -3246,7 +3191,7 @@
                   <a:schemeClr val="tx1"/>
                 </a:solidFill>
               </a:rPr>
-              <a:t>Garry Clawson</a:t>
+              <a:t>William Oldham</a:t>
             </a:r>
           </a:p>
           <a:p>
@@ -3322,7 +3267,7 @@
                   <a:schemeClr val="tx1"/>
                 </a:solidFill>
               </a:rPr>
-              <a:t>Nicholas Carl Jackson</a:t>
+              <a:t>Reece Andy Jones</a:t>
             </a:r>
           </a:p>
           <a:p>
@@ -3333,21 +3278,8 @@
                   <a:schemeClr val="tx1"/>
                 </a:solidFill>
               </a:rPr>
-              <a:t>Course Rep – </a:t>
-            </a:r>
-            <a:r>
-              <a:rPr lang="en-US" sz="800" dirty="0" err="1">
-                <a:solidFill>
-                  <a:schemeClr val="tx1"/>
-                </a:solidFill>
-              </a:rPr>
-              <a:t>Y2</a:t>
-            </a:r>
-            <a:endParaRPr lang="en-US" sz="800" dirty="0">
-              <a:solidFill>
-                <a:schemeClr val="tx1"/>
-              </a:solidFill>
-            </a:endParaRPr>
+              <a:t>Course Rep – Y3</a:t>
+            </a:r>
           </a:p>
         </p:txBody>
       </p:sp>
@@ -3411,7 +3343,7 @@
                   <a:schemeClr val="tx1"/>
                 </a:solidFill>
               </a:rPr>
-              <a:t>Reece Andy Jones</a:t>
+              <a:t>TBC</a:t>
             </a:r>
           </a:p>
           <a:p>
@@ -3422,21 +3354,8 @@
                   <a:schemeClr val="tx1"/>
                 </a:solidFill>
               </a:rPr>
-              <a:t>Course Rep – </a:t>
-            </a:r>
-            <a:r>
-              <a:rPr lang="en-US" sz="800" dirty="0" err="1">
-                <a:solidFill>
-                  <a:schemeClr val="tx1"/>
-                </a:solidFill>
-              </a:rPr>
-              <a:t>Y2</a:t>
-            </a:r>
-            <a:endParaRPr lang="en-US" sz="800" dirty="0">
-              <a:solidFill>
-                <a:schemeClr val="tx1"/>
-              </a:solidFill>
-            </a:endParaRPr>
+              <a:t>Course Rep – Y2</a:t>
+            </a:r>
           </a:p>
         </p:txBody>
       </p:sp>
@@ -3495,34 +3414,13 @@
           <a:p>
             <a:pPr algn="ctr"/>
             <a:r>
-              <a:rPr lang="en-US" sz="800" b="1" dirty="0" err="1">
-                <a:solidFill>
-                  <a:schemeClr val="tx1"/>
-                </a:solidFill>
-              </a:rPr>
-              <a:t>Zuzanna</a:t>
-            </a:r>
-            <a:r>
               <a:rPr lang="en-US" sz="800" b="1" dirty="0">
                 <a:solidFill>
                   <a:schemeClr val="tx1"/>
                 </a:solidFill>
               </a:rPr>
-              <a:t> </a:t>
-            </a:r>
-            <a:r>
-              <a:rPr lang="en-US" sz="800" b="1" dirty="0" err="1">
-                <a:solidFill>
-                  <a:schemeClr val="tx1"/>
-                </a:solidFill>
-              </a:rPr>
-              <a:t>Walaszczyk</a:t>
-            </a:r>
-            <a:endParaRPr lang="en-US" sz="800" b="1" dirty="0">
-              <a:solidFill>
-                <a:schemeClr val="tx1"/>
-              </a:solidFill>
-            </a:endParaRPr>
+              <a:t>TBC</a:t>
+            </a:r>
           </a:p>
           <a:p>
             <a:pPr algn="ctr"/>
@@ -3532,21 +3430,8 @@
                   <a:schemeClr val="tx1"/>
                 </a:solidFill>
               </a:rPr>
-              <a:t>Course Rep – </a:t>
-            </a:r>
-            <a:r>
-              <a:rPr lang="en-US" sz="800" dirty="0" err="1">
-                <a:solidFill>
-                  <a:schemeClr val="tx1"/>
-                </a:solidFill>
-              </a:rPr>
-              <a:t>Y2</a:t>
-            </a:r>
-            <a:endParaRPr lang="en-US" sz="800" dirty="0">
-              <a:solidFill>
-                <a:schemeClr val="tx1"/>
-              </a:solidFill>
-            </a:endParaRPr>
+              <a:t>Course Rep – Y2</a:t>
+            </a:r>
           </a:p>
         </p:txBody>
       </p:sp>
@@ -3610,7 +3495,7 @@
                   <a:schemeClr val="tx1"/>
                 </a:solidFill>
               </a:rPr>
-              <a:t>Benjamin Thomas Clarke</a:t>
+              <a:t>Brandon-Lee Dodds</a:t>
             </a:r>
           </a:p>
           <a:p>
@@ -3621,21 +3506,8 @@
                   <a:schemeClr val="tx1"/>
                 </a:solidFill>
               </a:rPr>
-              <a:t>Course Rep – </a:t>
-            </a:r>
-            <a:r>
-              <a:rPr lang="en-US" sz="800" dirty="0" err="1">
-                <a:solidFill>
-                  <a:schemeClr val="tx1"/>
-                </a:solidFill>
-              </a:rPr>
-              <a:t>Y3</a:t>
-            </a:r>
-            <a:endParaRPr lang="en-US" sz="800" dirty="0">
-              <a:solidFill>
-                <a:schemeClr val="tx1"/>
-              </a:solidFill>
-            </a:endParaRPr>
+              <a:t>Course Rep – Y3</a:t>
+            </a:r>
           </a:p>
         </p:txBody>
       </p:sp>
@@ -3699,21 +3571,8 @@
                   <a:schemeClr val="tx1"/>
                 </a:solidFill>
               </a:rPr>
-              <a:t>Brandon-Lee </a:t>
-            </a:r>
-            <a:r>
-              <a:rPr lang="en-US" sz="800" b="1" dirty="0" err="1">
-                <a:solidFill>
-                  <a:schemeClr val="tx1"/>
-                </a:solidFill>
-              </a:rPr>
-              <a:t>Dodds</a:t>
-            </a:r>
-            <a:endParaRPr lang="en-US" sz="800" b="1" dirty="0">
-              <a:solidFill>
-                <a:schemeClr val="tx1"/>
-              </a:solidFill>
-            </a:endParaRPr>
+              <a:t>TBC</a:t>
+            </a:r>
           </a:p>
           <a:p>
             <a:pPr algn="ctr"/>
@@ -3723,30 +3582,17 @@
                   <a:schemeClr val="tx1"/>
                 </a:solidFill>
               </a:rPr>
-              <a:t>Course Rep – </a:t>
-            </a:r>
-            <a:r>
-              <a:rPr lang="en-US" sz="800" dirty="0" err="1">
-                <a:solidFill>
-                  <a:schemeClr val="tx1"/>
-                </a:solidFill>
-              </a:rPr>
-              <a:t>Y2</a:t>
-            </a:r>
-            <a:endParaRPr lang="en-US" sz="800" dirty="0">
-              <a:solidFill>
-                <a:schemeClr val="tx1"/>
-              </a:solidFill>
-            </a:endParaRPr>
-          </a:p>
-        </p:txBody>
-      </p:sp>
-      <p:sp>
-        <p:nvSpPr>
-          <p:cNvPr id="13" name="Rounded Rectangle 12">
+              <a:t>Course Rep – Y2</a:t>
+            </a:r>
+          </a:p>
+        </p:txBody>
+      </p:sp>
+      <p:sp>
+        <p:nvSpPr>
+          <p:cNvPr id="14" name="Rounded Rectangle 13">
             <a:extLst>
               <a:ext uri="{FF2B5EF4-FFF2-40B4-BE49-F238E27FC236}">
-                <a16:creationId xmlns:a16="http://schemas.microsoft.com/office/drawing/2014/main" id="{B203CB37-9903-E84D-BEF8-7FD3330CA4C7}"/>
+                <a16:creationId xmlns:a16="http://schemas.microsoft.com/office/drawing/2014/main" id="{46516750-785C-EC46-80A6-538672D2139D}"/>
               </a:ext>
             </a:extLst>
           </p:cNvPr>
@@ -3755,7 +3601,7 @@
         </p:nvSpPr>
         <p:spPr>
           <a:xfrm>
-            <a:off x="7641278" y="2294443"/>
+            <a:off x="7658365" y="3069635"/>
             <a:ext cx="1124607" cy="430924"/>
           </a:xfrm>
           <a:prstGeom prst="roundRect">
@@ -3799,36 +3645,28 @@
                   <a:schemeClr val="tx1"/>
                 </a:solidFill>
               </a:rPr>
-              <a:t>Dr Salah Al-Majeed</a:t>
+              <a:t>Dr Chris Headleand</a:t>
             </a:r>
           </a:p>
           <a:p>
             <a:pPr algn="ctr"/>
-            <a:r>
-              <a:rPr lang="en-US" sz="800" dirty="0" err="1">
-                <a:solidFill>
-                  <a:schemeClr val="tx1"/>
-                </a:solidFill>
-              </a:rPr>
-              <a:t>SoCS</a:t>
-            </a:r>
             <a:r>
               <a:rPr lang="en-US" sz="800" dirty="0">
                 <a:solidFill>
                   <a:schemeClr val="tx1"/>
                 </a:solidFill>
               </a:rPr>
-              <a:t> Deputy Head of School</a:t>
-            </a:r>
-          </a:p>
-        </p:txBody>
-      </p:sp>
-      <p:sp>
-        <p:nvSpPr>
-          <p:cNvPr id="14" name="Rounded Rectangle 13">
+              <a:t>Director of Teaching &amp; Learning</a:t>
+            </a:r>
+          </a:p>
+        </p:txBody>
+      </p:sp>
+      <p:sp>
+        <p:nvSpPr>
+          <p:cNvPr id="15" name="Rounded Rectangle 14">
             <a:extLst>
               <a:ext uri="{FF2B5EF4-FFF2-40B4-BE49-F238E27FC236}">
-                <a16:creationId xmlns:a16="http://schemas.microsoft.com/office/drawing/2014/main" id="{46516750-785C-EC46-80A6-538672D2139D}"/>
+                <a16:creationId xmlns:a16="http://schemas.microsoft.com/office/drawing/2014/main" id="{7A97A579-9AF6-0148-B6DC-6B9D16B82040}"/>
               </a:ext>
             </a:extLst>
           </p:cNvPr>
@@ -3837,8 +3675,8 @@
         </p:nvSpPr>
         <p:spPr>
           <a:xfrm>
-            <a:off x="7667287" y="3063762"/>
-            <a:ext cx="1124607" cy="430924"/>
+            <a:off x="7647055" y="3859924"/>
+            <a:ext cx="1165063" cy="430924"/>
           </a:xfrm>
           <a:prstGeom prst="roundRect">
             <a:avLst>
@@ -3881,7 +3719,7 @@
                   <a:schemeClr val="tx1"/>
                 </a:solidFill>
               </a:rPr>
-              <a:t>Dr Chris </a:t>
+              <a:t>Dr Olivier </a:t>
             </a:r>
             <a:r>
               <a:rPr lang="en-US" sz="800" b="1" dirty="0" err="1">
@@ -3889,87 +3727,13 @@
                   <a:schemeClr val="tx1"/>
                 </a:solidFill>
               </a:rPr>
-              <a:t>Headleand</a:t>
+              <a:t>Szymanezyk</a:t>
             </a:r>
             <a:endParaRPr lang="en-US" sz="800" b="1" dirty="0">
               <a:solidFill>
                 <a:schemeClr val="tx1"/>
               </a:solidFill>
             </a:endParaRPr>
-          </a:p>
-          <a:p>
-            <a:pPr algn="ctr"/>
-            <a:r>
-              <a:rPr lang="en-US" sz="800" dirty="0">
-                <a:solidFill>
-                  <a:schemeClr val="tx1"/>
-                </a:solidFill>
-              </a:rPr>
-              <a:t>Director of Teaching &amp; Learning</a:t>
-            </a:r>
-          </a:p>
-        </p:txBody>
-      </p:sp>
-      <p:sp>
-        <p:nvSpPr>
-          <p:cNvPr id="15" name="Rounded Rectangle 14">
-            <a:extLst>
-              <a:ext uri="{FF2B5EF4-FFF2-40B4-BE49-F238E27FC236}">
-                <a16:creationId xmlns:a16="http://schemas.microsoft.com/office/drawing/2014/main" id="{7A97A579-9AF6-0148-B6DC-6B9D16B82040}"/>
-              </a:ext>
-            </a:extLst>
-          </p:cNvPr>
-          <p:cNvSpPr/>
-          <p:nvPr/>
-        </p:nvSpPr>
-        <p:spPr>
-          <a:xfrm>
-            <a:off x="7698818" y="3859924"/>
-            <a:ext cx="1124607" cy="430924"/>
-          </a:xfrm>
-          <a:prstGeom prst="roundRect">
-            <a:avLst>
-              <a:gd name="adj" fmla="val 9350"/>
-            </a:avLst>
-          </a:prstGeom>
-          <a:solidFill>
-            <a:schemeClr val="bg1"/>
-          </a:solidFill>
-          <a:ln>
-            <a:solidFill>
-              <a:srgbClr val="0070C0"/>
-            </a:solidFill>
-          </a:ln>
-        </p:spPr>
-        <p:style>
-          <a:lnRef idx="2">
-            <a:schemeClr val="accent1">
-              <a:shade val="50000"/>
-            </a:schemeClr>
-          </a:lnRef>
-          <a:fillRef idx="1">
-            <a:schemeClr val="accent1"/>
-          </a:fillRef>
-          <a:effectRef idx="0">
-            <a:schemeClr val="accent1"/>
-          </a:effectRef>
-          <a:fontRef idx="minor">
-            <a:schemeClr val="lt1"/>
-          </a:fontRef>
-        </p:style>
-        <p:txBody>
-          <a:bodyPr rtlCol="0" anchor="ctr"/>
-          <a:lstStyle/>
-          <a:p>
-            <a:pPr algn="ctr"/>
-            <a:r>
-              <a:rPr lang="en-US" sz="800" b="1" dirty="0">
-                <a:solidFill>
-                  <a:schemeClr val="tx1"/>
-                </a:solidFill>
-              </a:rPr>
-              <a:t>TBC</a:t>
-            </a:r>
           </a:p>
           <a:p>
             <a:pPr algn="ctr"/>
@@ -4469,7 +4233,7 @@
         </p:nvCxnSpPr>
         <p:spPr>
           <a:xfrm>
-            <a:off x="8229587" y="2722835"/>
+            <a:off x="8220667" y="2722835"/>
             <a:ext cx="1" cy="354724"/>
           </a:xfrm>
           <a:prstGeom prst="line">
@@ -4745,7 +4509,7 @@
                   </a:schemeClr>
                 </a:solidFill>
               </a:rPr>
-              <a:t>Sam R </a:t>
+              <a:t>Sam </a:t>
             </a:r>
             <a:r>
               <a:rPr lang="en-US" sz="800" b="1" dirty="0" err="1">
@@ -4755,7 +4519,7 @@
                   </a:schemeClr>
                 </a:solidFill>
               </a:rPr>
-              <a:t>Bloris</a:t>
+              <a:t>Blouri</a:t>
             </a:r>
             <a:r>
               <a:rPr lang="en-US" sz="800" b="1" dirty="0">
@@ -4838,6 +4602,16 @@
           <a:p>
             <a:pPr algn="ctr"/>
             <a:r>
+              <a:rPr lang="en-US" sz="800" b="1" dirty="0">
+                <a:solidFill>
+                  <a:schemeClr val="bg1">
+                    <a:lumMod val="65000"/>
+                  </a:schemeClr>
+                </a:solidFill>
+              </a:rPr>
+              <a:t>Matthew </a:t>
+            </a:r>
+            <a:r>
               <a:rPr lang="en-US" sz="800" b="1" dirty="0" err="1">
                 <a:solidFill>
                   <a:schemeClr val="bg1">
@@ -4845,27 +4619,7 @@
                   </a:schemeClr>
                 </a:solidFill>
               </a:rPr>
-              <a:t>Sohpie</a:t>
-            </a:r>
-            <a:r>
-              <a:rPr lang="en-US" sz="800" b="1" dirty="0">
-                <a:solidFill>
-                  <a:schemeClr val="bg1">
-                    <a:lumMod val="65000"/>
-                  </a:schemeClr>
-                </a:solidFill>
-              </a:rPr>
-              <a:t> N </a:t>
-            </a:r>
-            <a:r>
-              <a:rPr lang="en-US" sz="800" b="1" dirty="0" err="1">
-                <a:solidFill>
-                  <a:schemeClr val="bg1">
-                    <a:lumMod val="65000"/>
-                  </a:schemeClr>
-                </a:solidFill>
-              </a:rPr>
-              <a:t>Leggot</a:t>
+              <a:t>Gurnhill</a:t>
             </a:r>
             <a:endParaRPr lang="en-US" sz="800" b="1" dirty="0">
               <a:solidFill>
@@ -4952,7 +4706,7 @@
                   </a:schemeClr>
                 </a:solidFill>
               </a:rPr>
-              <a:t>Charlotte H Winspear</a:t>
+              <a:t>Karl Johnson</a:t>
             </a:r>
           </a:p>
           <a:p>
@@ -5032,25 +4786,8 @@
                   </a:schemeClr>
                 </a:solidFill>
               </a:rPr>
-              <a:t>Margaret-Ann K </a:t>
-            </a:r>
-            <a:r>
-              <a:rPr lang="en-US" sz="800" b="1" dirty="0" err="1">
-                <a:solidFill>
-                  <a:schemeClr val="bg1">
-                    <a:lumMod val="65000"/>
-                  </a:schemeClr>
-                </a:solidFill>
-              </a:rPr>
-              <a:t>Withington</a:t>
-            </a:r>
-            <a:endParaRPr lang="en-US" sz="800" b="1" dirty="0">
-              <a:solidFill>
-                <a:schemeClr val="bg1">
-                  <a:lumMod val="65000"/>
-                </a:schemeClr>
-              </a:solidFill>
-            </a:endParaRPr>
+              <a:t>William Evans</a:t>
+            </a:r>
           </a:p>
           <a:p>
             <a:pPr algn="ctr"/>
@@ -5493,7 +5230,7 @@
         </p:nvSpPr>
         <p:spPr>
           <a:xfrm>
-            <a:off x="6160358" y="165600"/>
+            <a:off x="6160358" y="112260"/>
             <a:ext cx="2673575" cy="280480"/>
           </a:xfrm>
           <a:prstGeom prst="roundRect">
@@ -5599,23 +5336,15 @@
           <a:p>
             <a:pPr algn="ctr"/>
             <a:r>
-              <a:rPr lang="en-US" sz="1000" b="1" dirty="0" err="1">
-                <a:solidFill>
-                  <a:schemeClr val="tx1"/>
-                </a:solidFill>
-              </a:rPr>
-              <a:t>SU</a:t>
-            </a:r>
-            <a:r>
               <a:rPr lang="en-US" sz="1000" b="1" dirty="0">
                 <a:solidFill>
                   <a:schemeClr val="tx1"/>
                 </a:solidFill>
               </a:rPr>
-              <a:t> </a:t>
-            </a:r>
-            <a:r>
-              <a:rPr lang="en-US" sz="1000" b="1" dirty="0" err="1">
+              <a:t>SU </a:t>
+            </a:r>
+            <a:r>
+              <a:rPr lang="en-GB" sz="1000" b="1" dirty="0">
                 <a:solidFill>
                   <a:schemeClr val="tx1"/>
                 </a:solidFill>
@@ -5715,13 +5444,8 @@
             <a:pPr algn="ctr"/>
             <a:r>
               <a:rPr lang="en-US" sz="800" dirty="0"/>
-              <a:t>Working with </a:t>
-            </a:r>
-            <a:r>
-              <a:rPr lang="en-US" sz="800" dirty="0" err="1"/>
-              <a:t>SoCS</a:t>
-            </a:r>
-            <a:endParaRPr lang="en-US" sz="800" dirty="0"/>
+              <a:t>Working with SoCS</a:t>
+            </a:r>
           </a:p>
         </p:txBody>
       </p:sp>
@@ -5778,13 +5502,15 @@
         </p:nvSpPr>
         <p:spPr>
           <a:xfrm>
-            <a:off x="883490" y="2561910"/>
-            <a:ext cx="4359829" cy="215444"/>
+            <a:off x="567872" y="2523805"/>
+            <a:ext cx="4150958" cy="215444"/>
           </a:xfrm>
           <a:prstGeom prst="rect">
             <a:avLst/>
           </a:prstGeom>
-          <a:noFill/>
+          <a:solidFill>
+            <a:srgbClr val="F5F5F5"/>
+          </a:solidFill>
         </p:spPr>
         <p:txBody>
           <a:bodyPr wrap="square" rtlCol="0">
@@ -5792,6 +5518,7 @@
           </a:bodyPr>
           <a:lstStyle/>
           <a:p>
+            <a:pPr algn="ctr"/>
             <a:r>
               <a:rPr lang="en-US" sz="800" dirty="0"/>
               <a:t>Working with School Rep Officers. </a:t>
@@ -5821,13 +5548,15 @@
         </p:nvSpPr>
         <p:spPr>
           <a:xfrm>
-            <a:off x="119370" y="1317747"/>
+            <a:off x="119370" y="1311397"/>
             <a:ext cx="2389111" cy="215444"/>
           </a:xfrm>
           <a:prstGeom prst="rect">
             <a:avLst/>
           </a:prstGeom>
-          <a:noFill/>
+          <a:solidFill>
+            <a:srgbClr val="F5F5F5"/>
+          </a:solidFill>
         </p:spPr>
         <p:txBody>
           <a:bodyPr wrap="square" rtlCol="0">
@@ -5856,44 +5585,8 @@
         </p:nvSpPr>
         <p:spPr>
           <a:xfrm>
-            <a:off x="6867168" y="3078199"/>
-            <a:ext cx="895337" cy="338554"/>
-          </a:xfrm>
-          <a:prstGeom prst="rect">
-            <a:avLst/>
-          </a:prstGeom>
-          <a:noFill/>
-        </p:spPr>
-        <p:txBody>
-          <a:bodyPr wrap="square" rtlCol="0">
-            <a:spAutoFit/>
-          </a:bodyPr>
-          <a:lstStyle/>
-          <a:p>
-            <a:pPr algn="ctr"/>
-            <a:r>
-              <a:rPr lang="en-US" sz="800" dirty="0"/>
-              <a:t>Weekly Meetings</a:t>
-            </a:r>
-          </a:p>
-        </p:txBody>
-      </p:sp>
-      <p:sp>
-        <p:nvSpPr>
-          <p:cNvPr id="55" name="TextBox 54">
-            <a:extLst>
-              <a:ext uri="{FF2B5EF4-FFF2-40B4-BE49-F238E27FC236}">
-                <a16:creationId xmlns:a16="http://schemas.microsoft.com/office/drawing/2014/main" id="{CF8791F7-B441-0446-9F79-FE5FCBFEE9B6}"/>
-              </a:ext>
-            </a:extLst>
-          </p:cNvPr>
-          <p:cNvSpPr txBox="1"/>
-          <p:nvPr/>
-        </p:nvSpPr>
-        <p:spPr>
-          <a:xfrm>
-            <a:off x="6868465" y="3855929"/>
-            <a:ext cx="895337" cy="338554"/>
+            <a:off x="6703360" y="3117992"/>
+            <a:ext cx="589531" cy="338554"/>
           </a:xfrm>
           <a:prstGeom prst="rect">
             <a:avLst/>
@@ -5928,7 +5621,7 @@
         </p:nvSpPr>
         <p:spPr>
           <a:xfrm>
-            <a:off x="6637892" y="2274110"/>
+            <a:off x="6509372" y="2270553"/>
             <a:ext cx="1020471" cy="461665"/>
           </a:xfrm>
           <a:prstGeom prst="rect">
@@ -5972,8 +5665,8 @@
         </p:nvSpPr>
         <p:spPr>
           <a:xfrm>
-            <a:off x="3244087" y="1909354"/>
-            <a:ext cx="895337" cy="461665"/>
+            <a:off x="3245791" y="1961361"/>
+            <a:ext cx="1138494" cy="338554"/>
           </a:xfrm>
           <a:prstGeom prst="rect">
             <a:avLst/>
@@ -6016,13 +5709,15 @@
         </p:nvSpPr>
         <p:spPr>
           <a:xfrm>
-            <a:off x="4382581" y="3717948"/>
+            <a:off x="4645120" y="3884645"/>
             <a:ext cx="795799" cy="338554"/>
           </a:xfrm>
           <a:prstGeom prst="rect">
             <a:avLst/>
           </a:prstGeom>
-          <a:noFill/>
+          <a:solidFill>
+            <a:srgbClr val="F5F5F5"/>
+          </a:solidFill>
         </p:spPr>
         <p:txBody>
           <a:bodyPr wrap="square" rtlCol="0">
@@ -6033,7 +5728,7 @@
             <a:pPr algn="ctr"/>
             <a:r>
               <a:rPr lang="en-US" sz="800" dirty="0"/>
-              <a:t>Daily rep interaction. </a:t>
+              <a:t>Daily rep interaction </a:t>
             </a:r>
           </a:p>
         </p:txBody>
@@ -6317,20 +6012,12 @@
           <a:p>
             <a:pPr algn="ctr"/>
             <a:r>
-              <a:rPr lang="en-US" sz="700" dirty="0" err="1">
-                <a:solidFill>
-                  <a:schemeClr val="tx1"/>
-                </a:solidFill>
-              </a:rPr>
-              <a:t>CoS</a:t>
-            </a:r>
-            <a:r>
               <a:rPr lang="en-US" sz="700" dirty="0">
                 <a:solidFill>
                   <a:schemeClr val="tx1"/>
                 </a:solidFill>
               </a:rPr>
-              <a:t> Director of Education and Students</a:t>
+              <a:t>CoS Director of Education and Students</a:t>
             </a:r>
           </a:p>
         </p:txBody>
@@ -6399,20 +6086,12 @@
           <a:p>
             <a:pPr algn="ctr"/>
             <a:r>
-              <a:rPr lang="en-US" sz="800" dirty="0" err="1">
-                <a:solidFill>
-                  <a:schemeClr val="tx1"/>
-                </a:solidFill>
-              </a:rPr>
-              <a:t>CoS</a:t>
-            </a:r>
-            <a:r>
               <a:rPr lang="en-US" sz="800" dirty="0">
                 <a:solidFill>
                   <a:schemeClr val="tx1"/>
                 </a:solidFill>
               </a:rPr>
-              <a:t> Director of Operations</a:t>
+              <a:t>CoS Director of Operations</a:t>
             </a:r>
           </a:p>
         </p:txBody>
@@ -6509,93 +6188,6 @@
           </a:fontRef>
         </p:style>
       </p:cxnSp>
-      <p:cxnSp>
-        <p:nvCxnSpPr>
-          <p:cNvPr id="72" name="Straight Connector 71">
-            <a:extLst>
-              <a:ext uri="{FF2B5EF4-FFF2-40B4-BE49-F238E27FC236}">
-                <a16:creationId xmlns:a16="http://schemas.microsoft.com/office/drawing/2014/main" id="{708FB50E-28B2-F840-9A0F-0AEA7B65FCBE}"/>
-              </a:ext>
-            </a:extLst>
-          </p:cNvPr>
-          <p:cNvCxnSpPr>
-            <a:cxnSpLocks/>
-          </p:cNvCxnSpPr>
-          <p:nvPr/>
-        </p:nvCxnSpPr>
-        <p:spPr>
-          <a:xfrm>
-            <a:off x="5043020" y="4406076"/>
-            <a:ext cx="1084579" cy="0"/>
-          </a:xfrm>
-          <a:prstGeom prst="line">
-            <a:avLst/>
-          </a:prstGeom>
-          <a:ln>
-            <a:solidFill>
-              <a:schemeClr val="bg1">
-                <a:lumMod val="50000"/>
-              </a:schemeClr>
-            </a:solidFill>
-            <a:prstDash val="dash"/>
-          </a:ln>
-        </p:spPr>
-        <p:style>
-          <a:lnRef idx="1">
-            <a:schemeClr val="accent1"/>
-          </a:lnRef>
-          <a:fillRef idx="0">
-            <a:schemeClr val="accent1"/>
-          </a:fillRef>
-          <a:effectRef idx="0">
-            <a:schemeClr val="accent1"/>
-          </a:effectRef>
-          <a:fontRef idx="minor">
-            <a:schemeClr val="tx1"/>
-          </a:fontRef>
-        </p:style>
-      </p:cxnSp>
-      <p:sp>
-        <p:nvSpPr>
-          <p:cNvPr id="78" name="TextBox 77">
-            <a:extLst>
-              <a:ext uri="{FF2B5EF4-FFF2-40B4-BE49-F238E27FC236}">
-                <a16:creationId xmlns:a16="http://schemas.microsoft.com/office/drawing/2014/main" id="{B63D7C26-5AE9-4C4D-8DC5-E741A31A8F9B}"/>
-              </a:ext>
-            </a:extLst>
-          </p:cNvPr>
-          <p:cNvSpPr txBox="1"/>
-          <p:nvPr/>
-        </p:nvSpPr>
-        <p:spPr>
-          <a:xfrm>
-            <a:off x="5053040" y="4190857"/>
-            <a:ext cx="965220" cy="215444"/>
-          </a:xfrm>
-          <a:prstGeom prst="rect">
-            <a:avLst/>
-          </a:prstGeom>
-          <a:noFill/>
-        </p:spPr>
-        <p:txBody>
-          <a:bodyPr wrap="square" rtlCol="0">
-            <a:spAutoFit/>
-          </a:bodyPr>
-          <a:lstStyle/>
-          <a:p>
-            <a:pPr algn="ctr"/>
-            <a:r>
-              <a:rPr lang="en-US" sz="800" dirty="0"/>
-              <a:t>Working with </a:t>
-            </a:r>
-            <a:r>
-              <a:rPr lang="en-US" sz="800" dirty="0" err="1"/>
-              <a:t>SoCS</a:t>
-            </a:r>
-            <a:endParaRPr lang="en-US" sz="800" dirty="0"/>
-          </a:p>
-        </p:txBody>
-      </p:sp>
       <p:sp>
         <p:nvSpPr>
           <p:cNvPr id="73" name="Rounded Rectangle 72">
@@ -6656,7 +6248,7 @@
                   <a:schemeClr val="tx1"/>
                 </a:solidFill>
               </a:rPr>
-              <a:t>Stewart Leonard</a:t>
+              <a:t>TBC</a:t>
             </a:r>
           </a:p>
           <a:p>
@@ -6768,7 +6360,7 @@
                   <a:schemeClr val="tx1"/>
                 </a:solidFill>
               </a:rPr>
-              <a:t>Ellie Broome</a:t>
+              <a:t>TBC</a:t>
             </a:r>
           </a:p>
           <a:p>
@@ -6967,6 +6559,116 @@
             <a:r>
               <a:rPr lang="en-US" sz="800" dirty="0"/>
               <a:t>Monthly Meetings</a:t>
+            </a:r>
+          </a:p>
+        </p:txBody>
+      </p:sp>
+      <p:sp>
+        <p:nvSpPr>
+          <p:cNvPr id="13" name="Rounded Rectangle 12">
+            <a:extLst>
+              <a:ext uri="{FF2B5EF4-FFF2-40B4-BE49-F238E27FC236}">
+                <a16:creationId xmlns:a16="http://schemas.microsoft.com/office/drawing/2014/main" id="{B203CB37-9903-E84D-BEF8-7FD3330CA4C7}"/>
+              </a:ext>
+            </a:extLst>
+          </p:cNvPr>
+          <p:cNvSpPr/>
+          <p:nvPr/>
+        </p:nvSpPr>
+        <p:spPr>
+          <a:xfrm>
+            <a:off x="7641278" y="2285923"/>
+            <a:ext cx="1124607" cy="430924"/>
+          </a:xfrm>
+          <a:prstGeom prst="roundRect">
+            <a:avLst>
+              <a:gd name="adj" fmla="val 9350"/>
+            </a:avLst>
+          </a:prstGeom>
+          <a:solidFill>
+            <a:schemeClr val="bg1"/>
+          </a:solidFill>
+          <a:ln>
+            <a:solidFill>
+              <a:srgbClr val="0070C0"/>
+            </a:solidFill>
+          </a:ln>
+        </p:spPr>
+        <p:style>
+          <a:lnRef idx="2">
+            <a:schemeClr val="accent1">
+              <a:shade val="50000"/>
+            </a:schemeClr>
+          </a:lnRef>
+          <a:fillRef idx="1">
+            <a:schemeClr val="accent1"/>
+          </a:fillRef>
+          <a:effectRef idx="0">
+            <a:schemeClr val="accent1"/>
+          </a:effectRef>
+          <a:fontRef idx="minor">
+            <a:schemeClr val="lt1"/>
+          </a:fontRef>
+        </p:style>
+        <p:txBody>
+          <a:bodyPr rtlCol="0" anchor="ctr"/>
+          <a:lstStyle/>
+          <a:p>
+            <a:pPr algn="ctr"/>
+            <a:r>
+              <a:rPr lang="en-US" sz="800" b="1" dirty="0">
+                <a:solidFill>
+                  <a:schemeClr val="tx1"/>
+                </a:solidFill>
+              </a:rPr>
+              <a:t>Dr Salah Al-Majeed</a:t>
+            </a:r>
+          </a:p>
+          <a:p>
+            <a:pPr algn="ctr"/>
+            <a:r>
+              <a:rPr lang="en-US" sz="800" dirty="0">
+                <a:solidFill>
+                  <a:schemeClr val="tx1"/>
+                </a:solidFill>
+              </a:rPr>
+              <a:t>SoCS Deputy Head of School</a:t>
+            </a:r>
+          </a:p>
+        </p:txBody>
+      </p:sp>
+      <p:sp>
+        <p:nvSpPr>
+          <p:cNvPr id="85" name="TextBox 84">
+            <a:extLst>
+              <a:ext uri="{FF2B5EF4-FFF2-40B4-BE49-F238E27FC236}">
+                <a16:creationId xmlns:a16="http://schemas.microsoft.com/office/drawing/2014/main" id="{7607D5D5-EE23-45DE-93BD-486EBFF1F104}"/>
+              </a:ext>
+            </a:extLst>
+          </p:cNvPr>
+          <p:cNvSpPr txBox="1"/>
+          <p:nvPr/>
+        </p:nvSpPr>
+        <p:spPr>
+          <a:xfrm>
+            <a:off x="6707323" y="3911356"/>
+            <a:ext cx="589531" cy="338554"/>
+          </a:xfrm>
+          <a:prstGeom prst="rect">
+            <a:avLst/>
+          </a:prstGeom>
+          <a:noFill/>
+        </p:spPr>
+        <p:txBody>
+          <a:bodyPr wrap="square" rtlCol="0">
+            <a:spAutoFit/>
+          </a:bodyPr>
+          <a:lstStyle/>
+          <a:p>
+            <a:pPr algn="ctr"/>
+            <a:r>
+              <a:rPr lang="en-US" sz="800" dirty="0"/>
+              <a:t>Weekly Meetings</a:t>
             </a:r>
           </a:p>
         </p:txBody>

</xml_diff>